<commit_message>
Fix problems with the presentation
</commit_message>
<xml_diff>
--- a/documents/alpha_green_presentation.pptx
+++ b/documents/alpha_green_presentation.pptx
@@ -11119,806 +11119,6 @@
   <p:clrMapOvr>
     <a:masterClrMapping/>
   </p:clrMapOvr>
-  <p:timing>
-    <p:tnLst>
-      <p:par>
-        <p:cTn id="1" dur="indefinite" restart="never" nodeType="tmRoot">
-          <p:childTnLst>
-            <p:seq concurrent="1" nextAc="seek">
-              <p:cTn id="2" dur="indefinite" nodeType="mainSeq">
-                <p:childTnLst>
-                  <p:par>
-                    <p:cTn id="3" fill="hold">
-                      <p:stCondLst>
-                        <p:cond delay="indefinite"/>
-                        <p:cond evt="onBegin" delay="0">
-                          <p:tn val="2"/>
-                        </p:cond>
-                      </p:stCondLst>
-                      <p:childTnLst>
-                        <p:par>
-                          <p:cTn id="4" fill="hold">
-                            <p:stCondLst>
-                              <p:cond delay="0"/>
-                            </p:stCondLst>
-                            <p:childTnLst>
-                              <p:par>
-                                <p:cTn id="5" presetID="42" presetClass="entr" presetSubtype="0" fill="hold" grpId="0" nodeType="afterEffect">
-                                  <p:stCondLst>
-                                    <p:cond delay="0"/>
-                                  </p:stCondLst>
-                                  <p:childTnLst>
-                                    <p:set>
-                                      <p:cBhvr>
-                                        <p:cTn id="6" dur="1" fill="hold">
-                                          <p:stCondLst>
-                                            <p:cond delay="0"/>
-                                          </p:stCondLst>
-                                        </p:cTn>
-                                        <p:tgtEl>
-                                          <p:spTgt spid="7"/>
-                                        </p:tgtEl>
-                                        <p:attrNameLst>
-                                          <p:attrName>style.visibility</p:attrName>
-                                        </p:attrNameLst>
-                                      </p:cBhvr>
-                                      <p:to>
-                                        <p:strVal val="visible"/>
-                                      </p:to>
-                                    </p:set>
-                                    <p:animEffect transition="in" filter="fade">
-                                      <p:cBhvr>
-                                        <p:cTn id="7" dur="1000"/>
-                                        <p:tgtEl>
-                                          <p:spTgt spid="7"/>
-                                        </p:tgtEl>
-                                      </p:cBhvr>
-                                    </p:animEffect>
-                                    <p:anim calcmode="lin" valueType="num">
-                                      <p:cBhvr>
-                                        <p:cTn id="8" dur="1000" fill="hold"/>
-                                        <p:tgtEl>
-                                          <p:spTgt spid="7"/>
-                                        </p:tgtEl>
-                                        <p:attrNameLst>
-                                          <p:attrName>ppt_x</p:attrName>
-                                        </p:attrNameLst>
-                                      </p:cBhvr>
-                                      <p:tavLst>
-                                        <p:tav tm="0">
-                                          <p:val>
-                                            <p:strVal val="#ppt_x"/>
-                                          </p:val>
-                                        </p:tav>
-                                        <p:tav tm="100000">
-                                          <p:val>
-                                            <p:strVal val="#ppt_x"/>
-                                          </p:val>
-                                        </p:tav>
-                                      </p:tavLst>
-                                    </p:anim>
-                                    <p:anim calcmode="lin" valueType="num">
-                                      <p:cBhvr>
-                                        <p:cTn id="9" dur="1000" fill="hold"/>
-                                        <p:tgtEl>
-                                          <p:spTgt spid="7"/>
-                                        </p:tgtEl>
-                                        <p:attrNameLst>
-                                          <p:attrName>ppt_y</p:attrName>
-                                        </p:attrNameLst>
-                                      </p:cBhvr>
-                                      <p:tavLst>
-                                        <p:tav tm="0">
-                                          <p:val>
-                                            <p:strVal val="#ppt_y+.1"/>
-                                          </p:val>
-                                        </p:tav>
-                                        <p:tav tm="100000">
-                                          <p:val>
-                                            <p:strVal val="#ppt_y"/>
-                                          </p:val>
-                                        </p:tav>
-                                      </p:tavLst>
-                                    </p:anim>
-                                  </p:childTnLst>
-                                </p:cTn>
-                              </p:par>
-                              <p:par>
-                                <p:cTn id="10" presetID="42" presetClass="entr" presetSubtype="0" fill="hold" grpId="0" nodeType="withEffect">
-                                  <p:stCondLst>
-                                    <p:cond delay="0"/>
-                                  </p:stCondLst>
-                                  <p:childTnLst>
-                                    <p:set>
-                                      <p:cBhvr>
-                                        <p:cTn id="11" dur="1" fill="hold">
-                                          <p:stCondLst>
-                                            <p:cond delay="0"/>
-                                          </p:stCondLst>
-                                        </p:cTn>
-                                        <p:tgtEl>
-                                          <p:spTgt spid="8">
-                                            <p:txEl>
-                                              <p:pRg st="0" end="0"/>
-                                            </p:txEl>
-                                          </p:spTgt>
-                                        </p:tgtEl>
-                                        <p:attrNameLst>
-                                          <p:attrName>style.visibility</p:attrName>
-                                        </p:attrNameLst>
-                                      </p:cBhvr>
-                                      <p:to>
-                                        <p:strVal val="visible"/>
-                                      </p:to>
-                                    </p:set>
-                                    <p:animEffect transition="in" filter="fade">
-                                      <p:cBhvr>
-                                        <p:cTn id="12" dur="1000"/>
-                                        <p:tgtEl>
-                                          <p:spTgt spid="8">
-                                            <p:txEl>
-                                              <p:pRg st="0" end="0"/>
-                                            </p:txEl>
-                                          </p:spTgt>
-                                        </p:tgtEl>
-                                      </p:cBhvr>
-                                    </p:animEffect>
-                                    <p:anim calcmode="lin" valueType="num">
-                                      <p:cBhvr>
-                                        <p:cTn id="13" dur="1000" fill="hold"/>
-                                        <p:tgtEl>
-                                          <p:spTgt spid="8">
-                                            <p:txEl>
-                                              <p:pRg st="0" end="0"/>
-                                            </p:txEl>
-                                          </p:spTgt>
-                                        </p:tgtEl>
-                                        <p:attrNameLst>
-                                          <p:attrName>ppt_x</p:attrName>
-                                        </p:attrNameLst>
-                                      </p:cBhvr>
-                                      <p:tavLst>
-                                        <p:tav tm="0">
-                                          <p:val>
-                                            <p:strVal val="#ppt_x"/>
-                                          </p:val>
-                                        </p:tav>
-                                        <p:tav tm="100000">
-                                          <p:val>
-                                            <p:strVal val="#ppt_x"/>
-                                          </p:val>
-                                        </p:tav>
-                                      </p:tavLst>
-                                    </p:anim>
-                                    <p:anim calcmode="lin" valueType="num">
-                                      <p:cBhvr>
-                                        <p:cTn id="14" dur="1000" fill="hold"/>
-                                        <p:tgtEl>
-                                          <p:spTgt spid="8">
-                                            <p:txEl>
-                                              <p:pRg st="0" end="0"/>
-                                            </p:txEl>
-                                          </p:spTgt>
-                                        </p:tgtEl>
-                                        <p:attrNameLst>
-                                          <p:attrName>ppt_y</p:attrName>
-                                        </p:attrNameLst>
-                                      </p:cBhvr>
-                                      <p:tavLst>
-                                        <p:tav tm="0">
-                                          <p:val>
-                                            <p:strVal val="#ppt_y+.1"/>
-                                          </p:val>
-                                        </p:tav>
-                                        <p:tav tm="100000">
-                                          <p:val>
-                                            <p:strVal val="#ppt_y"/>
-                                          </p:val>
-                                        </p:tav>
-                                      </p:tavLst>
-                                    </p:anim>
-                                  </p:childTnLst>
-                                </p:cTn>
-                              </p:par>
-                            </p:childTnLst>
-                          </p:cTn>
-                        </p:par>
-                        <p:par>
-                          <p:cTn id="15" fill="hold">
-                            <p:stCondLst>
-                              <p:cond delay="1000"/>
-                            </p:stCondLst>
-                            <p:childTnLst>
-                              <p:par>
-                                <p:cTn id="16" presetID="42" presetClass="entr" presetSubtype="0" fill="hold" grpId="0" nodeType="afterEffect">
-                                  <p:stCondLst>
-                                    <p:cond delay="0"/>
-                                  </p:stCondLst>
-                                  <p:childTnLst>
-                                    <p:set>
-                                      <p:cBhvr>
-                                        <p:cTn id="17" dur="1" fill="hold">
-                                          <p:stCondLst>
-                                            <p:cond delay="0"/>
-                                          </p:stCondLst>
-                                        </p:cTn>
-                                        <p:tgtEl>
-                                          <p:spTgt spid="10"/>
-                                        </p:tgtEl>
-                                        <p:attrNameLst>
-                                          <p:attrName>style.visibility</p:attrName>
-                                        </p:attrNameLst>
-                                      </p:cBhvr>
-                                      <p:to>
-                                        <p:strVal val="visible"/>
-                                      </p:to>
-                                    </p:set>
-                                    <p:animEffect transition="in" filter="fade">
-                                      <p:cBhvr>
-                                        <p:cTn id="18" dur="1000"/>
-                                        <p:tgtEl>
-                                          <p:spTgt spid="10"/>
-                                        </p:tgtEl>
-                                      </p:cBhvr>
-                                    </p:animEffect>
-                                    <p:anim calcmode="lin" valueType="num">
-                                      <p:cBhvr>
-                                        <p:cTn id="19" dur="1000" fill="hold"/>
-                                        <p:tgtEl>
-                                          <p:spTgt spid="10"/>
-                                        </p:tgtEl>
-                                        <p:attrNameLst>
-                                          <p:attrName>ppt_x</p:attrName>
-                                        </p:attrNameLst>
-                                      </p:cBhvr>
-                                      <p:tavLst>
-                                        <p:tav tm="0">
-                                          <p:val>
-                                            <p:strVal val="#ppt_x"/>
-                                          </p:val>
-                                        </p:tav>
-                                        <p:tav tm="100000">
-                                          <p:val>
-                                            <p:strVal val="#ppt_x"/>
-                                          </p:val>
-                                        </p:tav>
-                                      </p:tavLst>
-                                    </p:anim>
-                                    <p:anim calcmode="lin" valueType="num">
-                                      <p:cBhvr>
-                                        <p:cTn id="20" dur="1000" fill="hold"/>
-                                        <p:tgtEl>
-                                          <p:spTgt spid="10"/>
-                                        </p:tgtEl>
-                                        <p:attrNameLst>
-                                          <p:attrName>ppt_y</p:attrName>
-                                        </p:attrNameLst>
-                                      </p:cBhvr>
-                                      <p:tavLst>
-                                        <p:tav tm="0">
-                                          <p:val>
-                                            <p:strVal val="#ppt_y+.1"/>
-                                          </p:val>
-                                        </p:tav>
-                                        <p:tav tm="100000">
-                                          <p:val>
-                                            <p:strVal val="#ppt_y"/>
-                                          </p:val>
-                                        </p:tav>
-                                      </p:tavLst>
-                                    </p:anim>
-                                  </p:childTnLst>
-                                </p:cTn>
-                              </p:par>
-                              <p:par>
-                                <p:cTn id="21" presetID="42" presetClass="entr" presetSubtype="0" fill="hold" grpId="0" nodeType="withEffect">
-                                  <p:stCondLst>
-                                    <p:cond delay="0"/>
-                                  </p:stCondLst>
-                                  <p:childTnLst>
-                                    <p:set>
-                                      <p:cBhvr>
-                                        <p:cTn id="22" dur="1" fill="hold">
-                                          <p:stCondLst>
-                                            <p:cond delay="0"/>
-                                          </p:stCondLst>
-                                        </p:cTn>
-                                        <p:tgtEl>
-                                          <p:spTgt spid="11">
-                                            <p:txEl>
-                                              <p:pRg st="0" end="0"/>
-                                            </p:txEl>
-                                          </p:spTgt>
-                                        </p:tgtEl>
-                                        <p:attrNameLst>
-                                          <p:attrName>style.visibility</p:attrName>
-                                        </p:attrNameLst>
-                                      </p:cBhvr>
-                                      <p:to>
-                                        <p:strVal val="visible"/>
-                                      </p:to>
-                                    </p:set>
-                                    <p:animEffect transition="in" filter="fade">
-                                      <p:cBhvr>
-                                        <p:cTn id="23" dur="1000"/>
-                                        <p:tgtEl>
-                                          <p:spTgt spid="11">
-                                            <p:txEl>
-                                              <p:pRg st="0" end="0"/>
-                                            </p:txEl>
-                                          </p:spTgt>
-                                        </p:tgtEl>
-                                      </p:cBhvr>
-                                    </p:animEffect>
-                                    <p:anim calcmode="lin" valueType="num">
-                                      <p:cBhvr>
-                                        <p:cTn id="24" dur="1000" fill="hold"/>
-                                        <p:tgtEl>
-                                          <p:spTgt spid="11">
-                                            <p:txEl>
-                                              <p:pRg st="0" end="0"/>
-                                            </p:txEl>
-                                          </p:spTgt>
-                                        </p:tgtEl>
-                                        <p:attrNameLst>
-                                          <p:attrName>ppt_x</p:attrName>
-                                        </p:attrNameLst>
-                                      </p:cBhvr>
-                                      <p:tavLst>
-                                        <p:tav tm="0">
-                                          <p:val>
-                                            <p:strVal val="#ppt_x"/>
-                                          </p:val>
-                                        </p:tav>
-                                        <p:tav tm="100000">
-                                          <p:val>
-                                            <p:strVal val="#ppt_x"/>
-                                          </p:val>
-                                        </p:tav>
-                                      </p:tavLst>
-                                    </p:anim>
-                                    <p:anim calcmode="lin" valueType="num">
-                                      <p:cBhvr>
-                                        <p:cTn id="25" dur="1000" fill="hold"/>
-                                        <p:tgtEl>
-                                          <p:spTgt spid="11">
-                                            <p:txEl>
-                                              <p:pRg st="0" end="0"/>
-                                            </p:txEl>
-                                          </p:spTgt>
-                                        </p:tgtEl>
-                                        <p:attrNameLst>
-                                          <p:attrName>ppt_y</p:attrName>
-                                        </p:attrNameLst>
-                                      </p:cBhvr>
-                                      <p:tavLst>
-                                        <p:tav tm="0">
-                                          <p:val>
-                                            <p:strVal val="#ppt_y+.1"/>
-                                          </p:val>
-                                        </p:tav>
-                                        <p:tav tm="100000">
-                                          <p:val>
-                                            <p:strVal val="#ppt_y"/>
-                                          </p:val>
-                                        </p:tav>
-                                      </p:tavLst>
-                                    </p:anim>
-                                  </p:childTnLst>
-                                </p:cTn>
-                              </p:par>
-                            </p:childTnLst>
-                          </p:cTn>
-                        </p:par>
-                        <p:par>
-                          <p:cTn id="26" fill="hold">
-                            <p:stCondLst>
-                              <p:cond delay="2000"/>
-                            </p:stCondLst>
-                            <p:childTnLst>
-                              <p:par>
-                                <p:cTn id="27" presetID="42" presetClass="entr" presetSubtype="0" fill="hold" grpId="0" nodeType="afterEffect">
-                                  <p:stCondLst>
-                                    <p:cond delay="0"/>
-                                  </p:stCondLst>
-                                  <p:childTnLst>
-                                    <p:set>
-                                      <p:cBhvr>
-                                        <p:cTn id="28" dur="1" fill="hold">
-                                          <p:stCondLst>
-                                            <p:cond delay="0"/>
-                                          </p:stCondLst>
-                                        </p:cTn>
-                                        <p:tgtEl>
-                                          <p:spTgt spid="13"/>
-                                        </p:tgtEl>
-                                        <p:attrNameLst>
-                                          <p:attrName>style.visibility</p:attrName>
-                                        </p:attrNameLst>
-                                      </p:cBhvr>
-                                      <p:to>
-                                        <p:strVal val="visible"/>
-                                      </p:to>
-                                    </p:set>
-                                    <p:animEffect transition="in" filter="fade">
-                                      <p:cBhvr>
-                                        <p:cTn id="29" dur="1000"/>
-                                        <p:tgtEl>
-                                          <p:spTgt spid="13"/>
-                                        </p:tgtEl>
-                                      </p:cBhvr>
-                                    </p:animEffect>
-                                    <p:anim calcmode="lin" valueType="num">
-                                      <p:cBhvr>
-                                        <p:cTn id="30" dur="1000" fill="hold"/>
-                                        <p:tgtEl>
-                                          <p:spTgt spid="13"/>
-                                        </p:tgtEl>
-                                        <p:attrNameLst>
-                                          <p:attrName>ppt_x</p:attrName>
-                                        </p:attrNameLst>
-                                      </p:cBhvr>
-                                      <p:tavLst>
-                                        <p:tav tm="0">
-                                          <p:val>
-                                            <p:strVal val="#ppt_x"/>
-                                          </p:val>
-                                        </p:tav>
-                                        <p:tav tm="100000">
-                                          <p:val>
-                                            <p:strVal val="#ppt_x"/>
-                                          </p:val>
-                                        </p:tav>
-                                      </p:tavLst>
-                                    </p:anim>
-                                    <p:anim calcmode="lin" valueType="num">
-                                      <p:cBhvr>
-                                        <p:cTn id="31" dur="1000" fill="hold"/>
-                                        <p:tgtEl>
-                                          <p:spTgt spid="13"/>
-                                        </p:tgtEl>
-                                        <p:attrNameLst>
-                                          <p:attrName>ppt_y</p:attrName>
-                                        </p:attrNameLst>
-                                      </p:cBhvr>
-                                      <p:tavLst>
-                                        <p:tav tm="0">
-                                          <p:val>
-                                            <p:strVal val="#ppt_y+.1"/>
-                                          </p:val>
-                                        </p:tav>
-                                        <p:tav tm="100000">
-                                          <p:val>
-                                            <p:strVal val="#ppt_y"/>
-                                          </p:val>
-                                        </p:tav>
-                                      </p:tavLst>
-                                    </p:anim>
-                                  </p:childTnLst>
-                                </p:cTn>
-                              </p:par>
-                              <p:par>
-                                <p:cTn id="32" presetID="42" presetClass="entr" presetSubtype="0" fill="hold" grpId="0" nodeType="withEffect">
-                                  <p:stCondLst>
-                                    <p:cond delay="0"/>
-                                  </p:stCondLst>
-                                  <p:childTnLst>
-                                    <p:set>
-                                      <p:cBhvr>
-                                        <p:cTn id="33" dur="1" fill="hold">
-                                          <p:stCondLst>
-                                            <p:cond delay="0"/>
-                                          </p:stCondLst>
-                                        </p:cTn>
-                                        <p:tgtEl>
-                                          <p:spTgt spid="14">
-                                            <p:txEl>
-                                              <p:pRg st="0" end="0"/>
-                                            </p:txEl>
-                                          </p:spTgt>
-                                        </p:tgtEl>
-                                        <p:attrNameLst>
-                                          <p:attrName>style.visibility</p:attrName>
-                                        </p:attrNameLst>
-                                      </p:cBhvr>
-                                      <p:to>
-                                        <p:strVal val="visible"/>
-                                      </p:to>
-                                    </p:set>
-                                    <p:animEffect transition="in" filter="fade">
-                                      <p:cBhvr>
-                                        <p:cTn id="34" dur="1000"/>
-                                        <p:tgtEl>
-                                          <p:spTgt spid="14">
-                                            <p:txEl>
-                                              <p:pRg st="0" end="0"/>
-                                            </p:txEl>
-                                          </p:spTgt>
-                                        </p:tgtEl>
-                                      </p:cBhvr>
-                                    </p:animEffect>
-                                    <p:anim calcmode="lin" valueType="num">
-                                      <p:cBhvr>
-                                        <p:cTn id="35" dur="1000" fill="hold"/>
-                                        <p:tgtEl>
-                                          <p:spTgt spid="14">
-                                            <p:txEl>
-                                              <p:pRg st="0" end="0"/>
-                                            </p:txEl>
-                                          </p:spTgt>
-                                        </p:tgtEl>
-                                        <p:attrNameLst>
-                                          <p:attrName>ppt_x</p:attrName>
-                                        </p:attrNameLst>
-                                      </p:cBhvr>
-                                      <p:tavLst>
-                                        <p:tav tm="0">
-                                          <p:val>
-                                            <p:strVal val="#ppt_x"/>
-                                          </p:val>
-                                        </p:tav>
-                                        <p:tav tm="100000">
-                                          <p:val>
-                                            <p:strVal val="#ppt_x"/>
-                                          </p:val>
-                                        </p:tav>
-                                      </p:tavLst>
-                                    </p:anim>
-                                    <p:anim calcmode="lin" valueType="num">
-                                      <p:cBhvr>
-                                        <p:cTn id="36" dur="1000" fill="hold"/>
-                                        <p:tgtEl>
-                                          <p:spTgt spid="14">
-                                            <p:txEl>
-                                              <p:pRg st="0" end="0"/>
-                                            </p:txEl>
-                                          </p:spTgt>
-                                        </p:tgtEl>
-                                        <p:attrNameLst>
-                                          <p:attrName>ppt_y</p:attrName>
-                                        </p:attrNameLst>
-                                      </p:cBhvr>
-                                      <p:tavLst>
-                                        <p:tav tm="0">
-                                          <p:val>
-                                            <p:strVal val="#ppt_y+.1"/>
-                                          </p:val>
-                                        </p:tav>
-                                        <p:tav tm="100000">
-                                          <p:val>
-                                            <p:strVal val="#ppt_y"/>
-                                          </p:val>
-                                        </p:tav>
-                                      </p:tavLst>
-                                    </p:anim>
-                                  </p:childTnLst>
-                                </p:cTn>
-                              </p:par>
-                            </p:childTnLst>
-                          </p:cTn>
-                        </p:par>
-                        <p:par>
-                          <p:cTn id="37" fill="hold">
-                            <p:stCondLst>
-                              <p:cond delay="3000"/>
-                            </p:stCondLst>
-                            <p:childTnLst>
-                              <p:par>
-                                <p:cTn id="38" presetID="42" presetClass="entr" presetSubtype="0" fill="hold" grpId="0" nodeType="afterEffect">
-                                  <p:stCondLst>
-                                    <p:cond delay="0"/>
-                                  </p:stCondLst>
-                                  <p:childTnLst>
-                                    <p:set>
-                                      <p:cBhvr>
-                                        <p:cTn id="39" dur="1" fill="hold">
-                                          <p:stCondLst>
-                                            <p:cond delay="0"/>
-                                          </p:stCondLst>
-                                        </p:cTn>
-                                        <p:tgtEl>
-                                          <p:spTgt spid="16"/>
-                                        </p:tgtEl>
-                                        <p:attrNameLst>
-                                          <p:attrName>style.visibility</p:attrName>
-                                        </p:attrNameLst>
-                                      </p:cBhvr>
-                                      <p:to>
-                                        <p:strVal val="visible"/>
-                                      </p:to>
-                                    </p:set>
-                                    <p:animEffect transition="in" filter="fade">
-                                      <p:cBhvr>
-                                        <p:cTn id="40" dur="1000"/>
-                                        <p:tgtEl>
-                                          <p:spTgt spid="16"/>
-                                        </p:tgtEl>
-                                      </p:cBhvr>
-                                    </p:animEffect>
-                                    <p:anim calcmode="lin" valueType="num">
-                                      <p:cBhvr>
-                                        <p:cTn id="41" dur="1000" fill="hold"/>
-                                        <p:tgtEl>
-                                          <p:spTgt spid="16"/>
-                                        </p:tgtEl>
-                                        <p:attrNameLst>
-                                          <p:attrName>ppt_x</p:attrName>
-                                        </p:attrNameLst>
-                                      </p:cBhvr>
-                                      <p:tavLst>
-                                        <p:tav tm="0">
-                                          <p:val>
-                                            <p:strVal val="#ppt_x"/>
-                                          </p:val>
-                                        </p:tav>
-                                        <p:tav tm="100000">
-                                          <p:val>
-                                            <p:strVal val="#ppt_x"/>
-                                          </p:val>
-                                        </p:tav>
-                                      </p:tavLst>
-                                    </p:anim>
-                                    <p:anim calcmode="lin" valueType="num">
-                                      <p:cBhvr>
-                                        <p:cTn id="42" dur="1000" fill="hold"/>
-                                        <p:tgtEl>
-                                          <p:spTgt spid="16"/>
-                                        </p:tgtEl>
-                                        <p:attrNameLst>
-                                          <p:attrName>ppt_y</p:attrName>
-                                        </p:attrNameLst>
-                                      </p:cBhvr>
-                                      <p:tavLst>
-                                        <p:tav tm="0">
-                                          <p:val>
-                                            <p:strVal val="#ppt_y+.1"/>
-                                          </p:val>
-                                        </p:tav>
-                                        <p:tav tm="100000">
-                                          <p:val>
-                                            <p:strVal val="#ppt_y"/>
-                                          </p:val>
-                                        </p:tav>
-                                      </p:tavLst>
-                                    </p:anim>
-                                  </p:childTnLst>
-                                </p:cTn>
-                              </p:par>
-                              <p:par>
-                                <p:cTn id="43" presetID="42" presetClass="entr" presetSubtype="0" fill="hold" grpId="0" nodeType="withEffect">
-                                  <p:stCondLst>
-                                    <p:cond delay="0"/>
-                                  </p:stCondLst>
-                                  <p:childTnLst>
-                                    <p:set>
-                                      <p:cBhvr>
-                                        <p:cTn id="44" dur="1" fill="hold">
-                                          <p:stCondLst>
-                                            <p:cond delay="0"/>
-                                          </p:stCondLst>
-                                        </p:cTn>
-                                        <p:tgtEl>
-                                          <p:spTgt spid="17">
-                                            <p:txEl>
-                                              <p:pRg st="0" end="0"/>
-                                            </p:txEl>
-                                          </p:spTgt>
-                                        </p:tgtEl>
-                                        <p:attrNameLst>
-                                          <p:attrName>style.visibility</p:attrName>
-                                        </p:attrNameLst>
-                                      </p:cBhvr>
-                                      <p:to>
-                                        <p:strVal val="visible"/>
-                                      </p:to>
-                                    </p:set>
-                                    <p:animEffect transition="in" filter="fade">
-                                      <p:cBhvr>
-                                        <p:cTn id="45" dur="1000"/>
-                                        <p:tgtEl>
-                                          <p:spTgt spid="17">
-                                            <p:txEl>
-                                              <p:pRg st="0" end="0"/>
-                                            </p:txEl>
-                                          </p:spTgt>
-                                        </p:tgtEl>
-                                      </p:cBhvr>
-                                    </p:animEffect>
-                                    <p:anim calcmode="lin" valueType="num">
-                                      <p:cBhvr>
-                                        <p:cTn id="46" dur="1000" fill="hold"/>
-                                        <p:tgtEl>
-                                          <p:spTgt spid="17">
-                                            <p:txEl>
-                                              <p:pRg st="0" end="0"/>
-                                            </p:txEl>
-                                          </p:spTgt>
-                                        </p:tgtEl>
-                                        <p:attrNameLst>
-                                          <p:attrName>ppt_x</p:attrName>
-                                        </p:attrNameLst>
-                                      </p:cBhvr>
-                                      <p:tavLst>
-                                        <p:tav tm="0">
-                                          <p:val>
-                                            <p:strVal val="#ppt_x"/>
-                                          </p:val>
-                                        </p:tav>
-                                        <p:tav tm="100000">
-                                          <p:val>
-                                            <p:strVal val="#ppt_x"/>
-                                          </p:val>
-                                        </p:tav>
-                                      </p:tavLst>
-                                    </p:anim>
-                                    <p:anim calcmode="lin" valueType="num">
-                                      <p:cBhvr>
-                                        <p:cTn id="47" dur="1000" fill="hold"/>
-                                        <p:tgtEl>
-                                          <p:spTgt spid="17">
-                                            <p:txEl>
-                                              <p:pRg st="0" end="0"/>
-                                            </p:txEl>
-                                          </p:spTgt>
-                                        </p:tgtEl>
-                                        <p:attrNameLst>
-                                          <p:attrName>ppt_y</p:attrName>
-                                        </p:attrNameLst>
-                                      </p:cBhvr>
-                                      <p:tavLst>
-                                        <p:tav tm="0">
-                                          <p:val>
-                                            <p:strVal val="#ppt_y+.1"/>
-                                          </p:val>
-                                        </p:tav>
-                                        <p:tav tm="100000">
-                                          <p:val>
-                                            <p:strVal val="#ppt_y"/>
-                                          </p:val>
-                                        </p:tav>
-                                      </p:tavLst>
-                                    </p:anim>
-                                  </p:childTnLst>
-                                </p:cTn>
-                              </p:par>
-                            </p:childTnLst>
-                          </p:cTn>
-                        </p:par>
-                      </p:childTnLst>
-                    </p:cTn>
-                  </p:par>
-                </p:childTnLst>
-              </p:cTn>
-              <p:prevCondLst>
-                <p:cond evt="onPrev" delay="0">
-                  <p:tgtEl>
-                    <p:sldTgt/>
-                  </p:tgtEl>
-                </p:cond>
-              </p:prevCondLst>
-              <p:nextCondLst>
-                <p:cond evt="onNext" delay="0">
-                  <p:tgtEl>
-                    <p:sldTgt/>
-                  </p:tgtEl>
-                </p:cond>
-              </p:nextCondLst>
-            </p:seq>
-          </p:childTnLst>
-        </p:cTn>
-      </p:par>
-    </p:tnLst>
-    <p:bldLst>
-      <p:bldP spid="7" grpId="0"/>
-      <p:bldP spid="8" grpId="0" build="p"/>
-      <p:bldP spid="10" grpId="0"/>
-      <p:bldP spid="11" grpId="0" build="p"/>
-      <p:bldP spid="13" grpId="0"/>
-      <p:bldP spid="14" grpId="0" build="p"/>
-      <p:bldP spid="16" grpId="0"/>
-      <p:bldP spid="17" grpId="0" build="p"/>
-    </p:bldLst>
-  </p:timing>
 </p:sld>
 </file>
 
@@ -12714,203 +11914,6 @@
   <p:clrMapOvr>
     <a:masterClrMapping/>
   </p:clrMapOvr>
-  <p:timing>
-    <p:tnLst>
-      <p:par>
-        <p:cTn id="1" dur="indefinite" restart="never" nodeType="tmRoot">
-          <p:childTnLst>
-            <p:seq concurrent="1" nextAc="seek">
-              <p:cTn id="2" dur="indefinite" nodeType="mainSeq">
-                <p:childTnLst>
-                  <p:par>
-                    <p:cTn id="3" fill="hold">
-                      <p:stCondLst>
-                        <p:cond delay="indefinite"/>
-                        <p:cond evt="onBegin" delay="0">
-                          <p:tn val="2"/>
-                        </p:cond>
-                      </p:stCondLst>
-                      <p:childTnLst>
-                        <p:par>
-                          <p:cTn id="4" fill="hold">
-                            <p:stCondLst>
-                              <p:cond delay="0"/>
-                            </p:stCondLst>
-                            <p:childTnLst>
-                              <p:par>
-                                <p:cTn id="5" presetID="16" presetClass="entr" presetSubtype="21" fill="hold" grpId="0" nodeType="withEffect">
-                                  <p:stCondLst>
-                                    <p:cond delay="0"/>
-                                  </p:stCondLst>
-                                  <p:childTnLst>
-                                    <p:set>
-                                      <p:cBhvr>
-                                        <p:cTn id="6" dur="1" fill="hold">
-                                          <p:stCondLst>
-                                            <p:cond delay="0"/>
-                                          </p:stCondLst>
-                                        </p:cTn>
-                                        <p:tgtEl>
-                                          <p:spTgt spid="12"/>
-                                        </p:tgtEl>
-                                        <p:attrNameLst>
-                                          <p:attrName>style.visibility</p:attrName>
-                                        </p:attrNameLst>
-                                      </p:cBhvr>
-                                      <p:to>
-                                        <p:strVal val="visible"/>
-                                      </p:to>
-                                    </p:set>
-                                    <p:animEffect transition="in" filter="barn(inVertical)">
-                                      <p:cBhvr>
-                                        <p:cTn id="7" dur="1000"/>
-                                        <p:tgtEl>
-                                          <p:spTgt spid="12"/>
-                                        </p:tgtEl>
-                                      </p:cBhvr>
-                                    </p:animEffect>
-                                  </p:childTnLst>
-                                </p:cTn>
-                              </p:par>
-                              <p:par>
-                                <p:cTn id="8" presetID="16" presetClass="entr" presetSubtype="21" fill="hold" grpId="0" nodeType="withEffect">
-                                  <p:stCondLst>
-                                    <p:cond delay="0"/>
-                                  </p:stCondLst>
-                                  <p:childTnLst>
-                                    <p:set>
-                                      <p:cBhvr>
-                                        <p:cTn id="9" dur="1" fill="hold">
-                                          <p:stCondLst>
-                                            <p:cond delay="0"/>
-                                          </p:stCondLst>
-                                        </p:cTn>
-                                        <p:tgtEl>
-                                          <p:spTgt spid="14"/>
-                                        </p:tgtEl>
-                                        <p:attrNameLst>
-                                          <p:attrName>style.visibility</p:attrName>
-                                        </p:attrNameLst>
-                                      </p:cBhvr>
-                                      <p:to>
-                                        <p:strVal val="visible"/>
-                                      </p:to>
-                                    </p:set>
-                                    <p:animEffect transition="in" filter="barn(inVertical)">
-                                      <p:cBhvr>
-                                        <p:cTn id="10" dur="1000"/>
-                                        <p:tgtEl>
-                                          <p:spTgt spid="14"/>
-                                        </p:tgtEl>
-                                      </p:cBhvr>
-                                    </p:animEffect>
-                                  </p:childTnLst>
-                                </p:cTn>
-                              </p:par>
-                              <p:par>
-                                <p:cTn id="11" presetID="16" presetClass="entr" presetSubtype="21" fill="hold" grpId="0" nodeType="withEffect">
-                                  <p:stCondLst>
-                                    <p:cond delay="0"/>
-                                  </p:stCondLst>
-                                  <p:childTnLst>
-                                    <p:set>
-                                      <p:cBhvr>
-                                        <p:cTn id="12" dur="1" fill="hold">
-                                          <p:stCondLst>
-                                            <p:cond delay="0"/>
-                                          </p:stCondLst>
-                                        </p:cTn>
-                                        <p:tgtEl>
-                                          <p:spTgt spid="15"/>
-                                        </p:tgtEl>
-                                        <p:attrNameLst>
-                                          <p:attrName>style.visibility</p:attrName>
-                                        </p:attrNameLst>
-                                      </p:cBhvr>
-                                      <p:to>
-                                        <p:strVal val="visible"/>
-                                      </p:to>
-                                    </p:set>
-                                    <p:animEffect transition="in" filter="barn(inVertical)">
-                                      <p:cBhvr>
-                                        <p:cTn id="13" dur="1000"/>
-                                        <p:tgtEl>
-                                          <p:spTgt spid="15"/>
-                                        </p:tgtEl>
-                                      </p:cBhvr>
-                                    </p:animEffect>
-                                  </p:childTnLst>
-                                </p:cTn>
-                              </p:par>
-                              <p:par>
-                                <p:cTn id="14" presetID="16" presetClass="entr" presetSubtype="21" fill="hold" grpId="0" nodeType="withEffect">
-                                  <p:stCondLst>
-                                    <p:cond delay="0"/>
-                                  </p:stCondLst>
-                                  <p:childTnLst>
-                                    <p:set>
-                                      <p:cBhvr>
-                                        <p:cTn id="15" dur="1" fill="hold">
-                                          <p:stCondLst>
-                                            <p:cond delay="0"/>
-                                          </p:stCondLst>
-                                        </p:cTn>
-                                        <p:tgtEl>
-                                          <p:spTgt spid="16"/>
-                                        </p:tgtEl>
-                                        <p:attrNameLst>
-                                          <p:attrName>style.visibility</p:attrName>
-                                        </p:attrNameLst>
-                                      </p:cBhvr>
-                                      <p:to>
-                                        <p:strVal val="visible"/>
-                                      </p:to>
-                                    </p:set>
-                                    <p:animEffect transition="in" filter="barn(inVertical)">
-                                      <p:cBhvr>
-                                        <p:cTn id="16" dur="1000"/>
-                                        <p:tgtEl>
-                                          <p:spTgt spid="16"/>
-                                        </p:tgtEl>
-                                      </p:cBhvr>
-                                    </p:animEffect>
-                                  </p:childTnLst>
-                                </p:cTn>
-                              </p:par>
-                            </p:childTnLst>
-                          </p:cTn>
-                        </p:par>
-                      </p:childTnLst>
-                    </p:cTn>
-                  </p:par>
-                </p:childTnLst>
-              </p:cTn>
-              <p:prevCondLst>
-                <p:cond evt="onPrev" delay="0">
-                  <p:tgtEl>
-                    <p:sldTgt/>
-                  </p:tgtEl>
-                </p:cond>
-              </p:prevCondLst>
-              <p:nextCondLst>
-                <p:cond evt="onNext" delay="0">
-                  <p:tgtEl>
-                    <p:sldTgt/>
-                  </p:tgtEl>
-                </p:cond>
-              </p:nextCondLst>
-            </p:seq>
-          </p:childTnLst>
-        </p:cTn>
-      </p:par>
-    </p:tnLst>
-    <p:bldLst>
-      <p:bldP spid="12" grpId="0"/>
-      <p:bldP spid="14" grpId="0"/>
-      <p:bldP spid="15" grpId="0"/>
-      <p:bldP spid="16" grpId="0"/>
-    </p:bldLst>
-  </p:timing>
 </p:sld>
 </file>
 
@@ -13696,400 +12699,6 @@
   <p:clrMapOvr>
     <a:masterClrMapping/>
   </p:clrMapOvr>
-  <p:timing>
-    <p:tnLst>
-      <p:par>
-        <p:cTn id="1" dur="indefinite" restart="never" nodeType="tmRoot">
-          <p:childTnLst>
-            <p:seq concurrent="1" nextAc="seek">
-              <p:cTn id="2" dur="indefinite" nodeType="mainSeq">
-                <p:childTnLst>
-                  <p:par>
-                    <p:cTn id="3" fill="hold">
-                      <p:stCondLst>
-                        <p:cond delay="indefinite"/>
-                        <p:cond evt="onBegin" delay="0">
-                          <p:tn val="2"/>
-                        </p:cond>
-                      </p:stCondLst>
-                      <p:childTnLst>
-                        <p:par>
-                          <p:cTn id="4" fill="hold">
-                            <p:stCondLst>
-                              <p:cond delay="0"/>
-                            </p:stCondLst>
-                            <p:childTnLst>
-                              <p:par>
-                                <p:cTn id="5" presetID="21" presetClass="entr" presetSubtype="1" fill="hold" nodeType="afterEffect">
-                                  <p:stCondLst>
-                                    <p:cond delay="0"/>
-                                  </p:stCondLst>
-                                  <p:childTnLst>
-                                    <p:set>
-                                      <p:cBhvr>
-                                        <p:cTn id="6" dur="1" fill="hold">
-                                          <p:stCondLst>
-                                            <p:cond delay="0"/>
-                                          </p:stCondLst>
-                                        </p:cTn>
-                                        <p:tgtEl>
-                                          <p:spTgt spid="5"/>
-                                        </p:tgtEl>
-                                        <p:attrNameLst>
-                                          <p:attrName>style.visibility</p:attrName>
-                                        </p:attrNameLst>
-                                      </p:cBhvr>
-                                      <p:to>
-                                        <p:strVal val="visible"/>
-                                      </p:to>
-                                    </p:set>
-                                    <p:animEffect transition="in" filter="wheel(1)">
-                                      <p:cBhvr>
-                                        <p:cTn id="7" dur="2000"/>
-                                        <p:tgtEl>
-                                          <p:spTgt spid="5"/>
-                                        </p:tgtEl>
-                                      </p:cBhvr>
-                                    </p:animEffect>
-                                  </p:childTnLst>
-                                </p:cTn>
-                              </p:par>
-                            </p:childTnLst>
-                          </p:cTn>
-                        </p:par>
-                        <p:par>
-                          <p:cTn id="8" fill="hold">
-                            <p:stCondLst>
-                              <p:cond delay="2000"/>
-                            </p:stCondLst>
-                            <p:childTnLst>
-                              <p:par>
-                                <p:cTn id="9" presetID="21" presetClass="entr" presetSubtype="1" fill="hold" nodeType="afterEffect">
-                                  <p:stCondLst>
-                                    <p:cond delay="0"/>
-                                  </p:stCondLst>
-                                  <p:childTnLst>
-                                    <p:set>
-                                      <p:cBhvr>
-                                        <p:cTn id="10" dur="1" fill="hold">
-                                          <p:stCondLst>
-                                            <p:cond delay="0"/>
-                                          </p:stCondLst>
-                                        </p:cTn>
-                                        <p:tgtEl>
-                                          <p:spTgt spid="6"/>
-                                        </p:tgtEl>
-                                        <p:attrNameLst>
-                                          <p:attrName>style.visibility</p:attrName>
-                                        </p:attrNameLst>
-                                      </p:cBhvr>
-                                      <p:to>
-                                        <p:strVal val="visible"/>
-                                      </p:to>
-                                    </p:set>
-                                    <p:animEffect transition="in" filter="wheel(1)">
-                                      <p:cBhvr>
-                                        <p:cTn id="11" dur="2000"/>
-                                        <p:tgtEl>
-                                          <p:spTgt spid="6"/>
-                                        </p:tgtEl>
-                                      </p:cBhvr>
-                                    </p:animEffect>
-                                  </p:childTnLst>
-                                </p:cTn>
-                              </p:par>
-                            </p:childTnLst>
-                          </p:cTn>
-                        </p:par>
-                        <p:par>
-                          <p:cTn id="12" fill="hold">
-                            <p:stCondLst>
-                              <p:cond delay="4000"/>
-                            </p:stCondLst>
-                            <p:childTnLst>
-                              <p:par>
-                                <p:cTn id="13" presetID="21" presetClass="entr" presetSubtype="2" fill="hold" nodeType="afterEffect">
-                                  <p:stCondLst>
-                                    <p:cond delay="0"/>
-                                  </p:stCondLst>
-                                  <p:childTnLst>
-                                    <p:set>
-                                      <p:cBhvr>
-                                        <p:cTn id="14" dur="1" fill="hold">
-                                          <p:stCondLst>
-                                            <p:cond delay="0"/>
-                                          </p:stCondLst>
-                                        </p:cTn>
-                                        <p:tgtEl>
-                                          <p:spTgt spid="7"/>
-                                        </p:tgtEl>
-                                        <p:attrNameLst>
-                                          <p:attrName>style.visibility</p:attrName>
-                                        </p:attrNameLst>
-                                      </p:cBhvr>
-                                      <p:to>
-                                        <p:strVal val="visible"/>
-                                      </p:to>
-                                    </p:set>
-                                    <p:animEffect transition="in" filter="wheel(2)">
-                                      <p:cBhvr>
-                                        <p:cTn id="15" dur="2000"/>
-                                        <p:tgtEl>
-                                          <p:spTgt spid="7"/>
-                                        </p:tgtEl>
-                                      </p:cBhvr>
-                                    </p:animEffect>
-                                  </p:childTnLst>
-                                </p:cTn>
-                              </p:par>
-                            </p:childTnLst>
-                          </p:cTn>
-                        </p:par>
-                        <p:par>
-                          <p:cTn id="16" fill="hold">
-                            <p:stCondLst>
-                              <p:cond delay="6000"/>
-                            </p:stCondLst>
-                            <p:childTnLst>
-                              <p:par>
-                                <p:cTn id="17" presetID="21" presetClass="entr" presetSubtype="2" fill="hold" nodeType="afterEffect">
-                                  <p:stCondLst>
-                                    <p:cond delay="0"/>
-                                  </p:stCondLst>
-                                  <p:childTnLst>
-                                    <p:set>
-                                      <p:cBhvr>
-                                        <p:cTn id="18" dur="1" fill="hold">
-                                          <p:stCondLst>
-                                            <p:cond delay="0"/>
-                                          </p:stCondLst>
-                                        </p:cTn>
-                                        <p:tgtEl>
-                                          <p:spTgt spid="8"/>
-                                        </p:tgtEl>
-                                        <p:attrNameLst>
-                                          <p:attrName>style.visibility</p:attrName>
-                                        </p:attrNameLst>
-                                      </p:cBhvr>
-                                      <p:to>
-                                        <p:strVal val="visible"/>
-                                      </p:to>
-                                    </p:set>
-                                    <p:animEffect transition="in" filter="wheel(2)">
-                                      <p:cBhvr>
-                                        <p:cTn id="19" dur="2000"/>
-                                        <p:tgtEl>
-                                          <p:spTgt spid="8"/>
-                                        </p:tgtEl>
-                                      </p:cBhvr>
-                                    </p:animEffect>
-                                  </p:childTnLst>
-                                </p:cTn>
-                              </p:par>
-                            </p:childTnLst>
-                          </p:cTn>
-                        </p:par>
-                        <p:par>
-                          <p:cTn id="20" fill="hold">
-                            <p:stCondLst>
-                              <p:cond delay="8000"/>
-                            </p:stCondLst>
-                            <p:childTnLst>
-                              <p:par>
-                                <p:cTn id="21" presetID="21" presetClass="entr" presetSubtype="3" fill="hold" nodeType="afterEffect">
-                                  <p:stCondLst>
-                                    <p:cond delay="0"/>
-                                  </p:stCondLst>
-                                  <p:childTnLst>
-                                    <p:set>
-                                      <p:cBhvr>
-                                        <p:cTn id="22" dur="1" fill="hold">
-                                          <p:stCondLst>
-                                            <p:cond delay="0"/>
-                                          </p:stCondLst>
-                                        </p:cTn>
-                                        <p:tgtEl>
-                                          <p:spTgt spid="9"/>
-                                        </p:tgtEl>
-                                        <p:attrNameLst>
-                                          <p:attrName>style.visibility</p:attrName>
-                                        </p:attrNameLst>
-                                      </p:cBhvr>
-                                      <p:to>
-                                        <p:strVal val="visible"/>
-                                      </p:to>
-                                    </p:set>
-                                    <p:animEffect transition="in" filter="wheel(3)">
-                                      <p:cBhvr>
-                                        <p:cTn id="23" dur="2000"/>
-                                        <p:tgtEl>
-                                          <p:spTgt spid="9"/>
-                                        </p:tgtEl>
-                                      </p:cBhvr>
-                                    </p:animEffect>
-                                  </p:childTnLst>
-                                </p:cTn>
-                              </p:par>
-                            </p:childTnLst>
-                          </p:cTn>
-                        </p:par>
-                        <p:par>
-                          <p:cTn id="24" fill="hold">
-                            <p:stCondLst>
-                              <p:cond delay="10000"/>
-                            </p:stCondLst>
-                            <p:childTnLst>
-                              <p:par>
-                                <p:cTn id="25" presetID="21" presetClass="entr" presetSubtype="3" fill="hold" nodeType="afterEffect">
-                                  <p:stCondLst>
-                                    <p:cond delay="0"/>
-                                  </p:stCondLst>
-                                  <p:childTnLst>
-                                    <p:set>
-                                      <p:cBhvr>
-                                        <p:cTn id="26" dur="1" fill="hold">
-                                          <p:stCondLst>
-                                            <p:cond delay="0"/>
-                                          </p:stCondLst>
-                                        </p:cTn>
-                                        <p:tgtEl>
-                                          <p:spTgt spid="10"/>
-                                        </p:tgtEl>
-                                        <p:attrNameLst>
-                                          <p:attrName>style.visibility</p:attrName>
-                                        </p:attrNameLst>
-                                      </p:cBhvr>
-                                      <p:to>
-                                        <p:strVal val="visible"/>
-                                      </p:to>
-                                    </p:set>
-                                    <p:animEffect transition="in" filter="wheel(3)">
-                                      <p:cBhvr>
-                                        <p:cTn id="27" dur="2000"/>
-                                        <p:tgtEl>
-                                          <p:spTgt spid="10"/>
-                                        </p:tgtEl>
-                                      </p:cBhvr>
-                                    </p:animEffect>
-                                  </p:childTnLst>
-                                </p:cTn>
-                              </p:par>
-                            </p:childTnLst>
-                          </p:cTn>
-                        </p:par>
-                        <p:par>
-                          <p:cTn id="28" fill="hold">
-                            <p:stCondLst>
-                              <p:cond delay="12000"/>
-                            </p:stCondLst>
-                            <p:childTnLst>
-                              <p:par>
-                                <p:cTn id="29" presetID="21" presetClass="entr" presetSubtype="4" fill="hold" nodeType="afterEffect">
-                                  <p:stCondLst>
-                                    <p:cond delay="0"/>
-                                  </p:stCondLst>
-                                  <p:childTnLst>
-                                    <p:set>
-                                      <p:cBhvr>
-                                        <p:cTn id="30" dur="1" fill="hold">
-                                          <p:stCondLst>
-                                            <p:cond delay="0"/>
-                                          </p:stCondLst>
-                                        </p:cTn>
-                                        <p:tgtEl>
-                                          <p:spTgt spid="11"/>
-                                        </p:tgtEl>
-                                        <p:attrNameLst>
-                                          <p:attrName>style.visibility</p:attrName>
-                                        </p:attrNameLst>
-                                      </p:cBhvr>
-                                      <p:to>
-                                        <p:strVal val="visible"/>
-                                      </p:to>
-                                    </p:set>
-                                    <p:animEffect transition="in" filter="wheel(4)">
-                                      <p:cBhvr>
-                                        <p:cTn id="31" dur="2000"/>
-                                        <p:tgtEl>
-                                          <p:spTgt spid="11"/>
-                                        </p:tgtEl>
-                                      </p:cBhvr>
-                                    </p:animEffect>
-                                  </p:childTnLst>
-                                </p:cTn>
-                              </p:par>
-                            </p:childTnLst>
-                          </p:cTn>
-                        </p:par>
-                        <p:par>
-                          <p:cTn id="32" fill="hold">
-                            <p:stCondLst>
-                              <p:cond delay="14000"/>
-                            </p:stCondLst>
-                            <p:childTnLst>
-                              <p:par>
-                                <p:cTn id="33" presetID="21" presetClass="entr" presetSubtype="8" fill="hold" nodeType="afterEffect">
-                                  <p:stCondLst>
-                                    <p:cond delay="0"/>
-                                  </p:stCondLst>
-                                  <p:childTnLst>
-                                    <p:set>
-                                      <p:cBhvr>
-                                        <p:cTn id="34" dur="1" fill="hold">
-                                          <p:stCondLst>
-                                            <p:cond delay="0"/>
-                                          </p:stCondLst>
-                                        </p:cTn>
-                                        <p:tgtEl>
-                                          <p:spTgt spid="12"/>
-                                        </p:tgtEl>
-                                        <p:attrNameLst>
-                                          <p:attrName>style.visibility</p:attrName>
-                                        </p:attrNameLst>
-                                      </p:cBhvr>
-                                      <p:to>
-                                        <p:strVal val="visible"/>
-                                      </p:to>
-                                    </p:set>
-                                    <p:animEffect transition="in" filter="wheel(8)">
-                                      <p:cBhvr>
-                                        <p:cTn id="35" dur="2000"/>
-                                        <p:tgtEl>
-                                          <p:spTgt spid="12"/>
-                                        </p:tgtEl>
-                                      </p:cBhvr>
-                                    </p:animEffect>
-                                  </p:childTnLst>
-                                </p:cTn>
-                              </p:par>
-                            </p:childTnLst>
-                          </p:cTn>
-                        </p:par>
-                      </p:childTnLst>
-                    </p:cTn>
-                  </p:par>
-                </p:childTnLst>
-              </p:cTn>
-              <p:prevCondLst>
-                <p:cond evt="onPrev" delay="0">
-                  <p:tgtEl>
-                    <p:sldTgt/>
-                  </p:tgtEl>
-                </p:cond>
-              </p:prevCondLst>
-              <p:nextCondLst>
-                <p:cond evt="onNext" delay="0">
-                  <p:tgtEl>
-                    <p:sldTgt/>
-                  </p:tgtEl>
-                </p:cond>
-              </p:nextCondLst>
-            </p:seq>
-          </p:childTnLst>
-        </p:cTn>
-      </p:par>
-    </p:tnLst>
-  </p:timing>
 </p:sld>
 </file>
 

</xml_diff>